<commit_message>
doc du sprint 2
</commit_message>
<xml_diff>
--- a/1-Documentations/B - Rendu Sprint 2/Conseil 7.pptx
+++ b/1-Documentations/B - Rendu Sprint 2/Conseil 7.pptx
@@ -216,7 +216,7 @@
       </p14:sectionLst>
     </p:ext>
     <p:ext uri="{EFAFB233-063F-42B5-8137-9DF3F51BA10A}">
-      <p15:sldGuideLst xmlns="" xmlns:p15="http://schemas.microsoft.com/office/powerpoint/2012/main">
+      <p15:sldGuideLst xmlns:p15="http://schemas.microsoft.com/office/powerpoint/2012/main" xmlns="">
         <p15:guide id="1" orient="horz" pos="2160">
           <p15:clr>
             <a:srgbClr val="A4A3A4"/>
@@ -422,11 +422,11 @@
         </c:dLbls>
         <c:marker val="1"/>
         <c:smooth val="0"/>
-        <c:axId val="86294912"/>
-        <c:axId val="88343296"/>
+        <c:axId val="94552448"/>
+        <c:axId val="94565120"/>
       </c:lineChart>
       <c:catAx>
-        <c:axId val="86294912"/>
+        <c:axId val="94552448"/>
         <c:scaling>
           <c:orientation val="minMax"/>
         </c:scaling>
@@ -455,7 +455,7 @@
         <c:majorTickMark val="none"/>
         <c:minorTickMark val="none"/>
         <c:tickLblPos val="nextTo"/>
-        <c:crossAx val="88343296"/>
+        <c:crossAx val="94565120"/>
         <c:crosses val="autoZero"/>
         <c:auto val="1"/>
         <c:lblAlgn val="ctr"/>
@@ -463,7 +463,7 @@
         <c:noMultiLvlLbl val="0"/>
       </c:catAx>
       <c:valAx>
-        <c:axId val="88343296"/>
+        <c:axId val="94565120"/>
         <c:scaling>
           <c:orientation val="maxMin"/>
         </c:scaling>
@@ -493,7 +493,7 @@
         <c:majorTickMark val="none"/>
         <c:minorTickMark val="none"/>
         <c:tickLblPos val="nextTo"/>
-        <c:crossAx val="86294912"/>
+        <c:crossAx val="94552448"/>
         <c:crosses val="autoZero"/>
         <c:crossBetween val="between"/>
       </c:valAx>
@@ -17350,6 +17350,18 @@
               <a:rPr lang="fr-FR" dirty="0" smtClean="0"/>
               <a:t>Célia</a:t>
             </a:r>
+          </a:p>
+          <a:p>
+            <a:r>
+              <a:rPr lang="fr-FR" dirty="0" smtClean="0"/>
+              <a:t>Déplacement du laurier</a:t>
+            </a:r>
+          </a:p>
+          <a:p>
+            <a:r>
+              <a:rPr lang="fr-FR" dirty="0" smtClean="0"/>
+              <a:t>Abandon d’une partie</a:t>
+            </a:r>
             <a:endParaRPr lang="fr-FR" dirty="0"/>
           </a:p>
         </p:txBody>
@@ -17613,6 +17625,34 @@
             <a:r>
               <a:rPr lang="fr-FR" dirty="0" smtClean="0"/>
               <a:t>Célia</a:t>
+            </a:r>
+          </a:p>
+          <a:p>
+            <a:r>
+              <a:rPr lang="fr-FR" dirty="0" smtClean="0"/>
+              <a:t>Déplacement des pions</a:t>
+            </a:r>
+          </a:p>
+          <a:p>
+            <a:r>
+              <a:rPr lang="fr-FR" dirty="0" smtClean="0"/>
+              <a:t>Lancement de la partie</a:t>
+            </a:r>
+          </a:p>
+          <a:p>
+            <a:r>
+              <a:rPr lang="fr-FR" dirty="0" smtClean="0"/>
+              <a:t>Suppression</a:t>
+            </a:r>
+            <a:r>
+              <a:rPr lang="fr-FR" baseline="0" dirty="0" smtClean="0"/>
+              <a:t> d’une partie</a:t>
+            </a:r>
+          </a:p>
+          <a:p>
+            <a:r>
+              <a:rPr lang="fr-FR" baseline="0" dirty="0" smtClean="0"/>
+              <a:t>Abandon d’une partie</a:t>
             </a:r>
             <a:endParaRPr lang="fr-FR" dirty="0"/>
           </a:p>
@@ -23617,8 +23657,9 @@
             </a:pPr>
             <a:r>
               <a:rPr lang="fr-FR" dirty="0" smtClean="0"/>
-              <a:t>Chater</a:t>
+              <a:t>Chatter</a:t>
             </a:r>
+            <a:endParaRPr lang="fr-FR" dirty="0" smtClean="0"/>
           </a:p>
           <a:p>
             <a:pPr>
@@ -24353,8 +24394,9 @@
             </a:pPr>
             <a:r>
               <a:rPr lang="fr-FR" dirty="0" smtClean="0"/>
-              <a:t>Chater</a:t>
+              <a:t>Chatter</a:t>
             </a:r>
+            <a:endParaRPr lang="fr-FR" dirty="0" smtClean="0"/>
           </a:p>
           <a:p>
             <a:pPr>
@@ -28344,7 +28386,7 @@
   <a:extraClrSchemeLst/>
   <a:extLst>
     <a:ext uri="{05A4C25C-085E-4340-85A3-A5531E510DB2}">
-      <thm15:themeFamily xmlns="" xmlns:thm15="http://schemas.microsoft.com/office/thememl/2012/main" name="Office Theme" id="{62F939B6-93AF-4DB8-9C6B-D6C7DFDC589F}" vid="{4A3C46E8-61CC-4603-A589-7422A47A8E4A}"/>
+      <thm15:themeFamily xmlns:thm15="http://schemas.microsoft.com/office/thememl/2012/main" xmlns="" name="Office Theme" id="{62F939B6-93AF-4DB8-9C6B-D6C7DFDC589F}" vid="{4A3C46E8-61CC-4603-A589-7422A47A8E4A}"/>
     </a:ext>
   </a:extLst>
 </a:theme>

</xml_diff>